<commit_message>
agregados otros modelos a la presentación y guardarla pomo pdf
</commit_message>
<xml_diff>
--- a/slides/RNN-slides.pptx
+++ b/slides/RNN-slides.pptx
@@ -23,6 +23,12 @@
     <p:sldId id="279" r:id="rId17"/>
     <p:sldId id="280" r:id="rId18"/>
     <p:sldId id="282" r:id="rId19"/>
+    <p:sldId id="283" r:id="rId20"/>
+    <p:sldId id="284" r:id="rId21"/>
+    <p:sldId id="285" r:id="rId22"/>
+    <p:sldId id="286" r:id="rId23"/>
+    <p:sldId id="287" r:id="rId24"/>
+    <p:sldId id="288" r:id="rId25"/>
   </p:sldIdLst>
   <p:sldSz cx="12192000" cy="6858000"/>
   <p:notesSz cx="6858000" cy="9144000"/>
@@ -282,7 +288,7 @@
           <a:p>
             <a:fld id="{999A8DD2-C443-44AD-85B3-4CE72B962C5F}" type="datetimeFigureOut">
               <a:rPr lang="en-US" smtClean="0"/>
-              <a:t>5/21/24</a:t>
+              <a:t>5/25/24</a:t>
             </a:fld>
             <a:endParaRPr lang="en-US"/>
           </a:p>
@@ -490,7 +496,7 @@
           <a:p>
             <a:fld id="{999A8DD2-C443-44AD-85B3-4CE72B962C5F}" type="datetimeFigureOut">
               <a:rPr lang="en-US" smtClean="0"/>
-              <a:t>5/21/24</a:t>
+              <a:t>5/25/24</a:t>
             </a:fld>
             <a:endParaRPr lang="en-US"/>
           </a:p>
@@ -698,7 +704,7 @@
           <a:p>
             <a:fld id="{999A8DD2-C443-44AD-85B3-4CE72B962C5F}" type="datetimeFigureOut">
               <a:rPr lang="en-US" smtClean="0"/>
-              <a:t>5/21/24</a:t>
+              <a:t>5/25/24</a:t>
             </a:fld>
             <a:endParaRPr lang="en-US"/>
           </a:p>
@@ -896,7 +902,7 @@
           <a:p>
             <a:fld id="{999A8DD2-C443-44AD-85B3-4CE72B962C5F}" type="datetimeFigureOut">
               <a:rPr lang="en-US" smtClean="0"/>
-              <a:t>5/21/24</a:t>
+              <a:t>5/25/24</a:t>
             </a:fld>
             <a:endParaRPr lang="en-US"/>
           </a:p>
@@ -1174,7 +1180,7 @@
           <a:p>
             <a:fld id="{999A8DD2-C443-44AD-85B3-4CE72B962C5F}" type="datetimeFigureOut">
               <a:rPr lang="en-US" smtClean="0"/>
-              <a:t>5/21/24</a:t>
+              <a:t>5/25/24</a:t>
             </a:fld>
             <a:endParaRPr lang="en-US"/>
           </a:p>
@@ -1446,7 +1452,7 @@
           <a:p>
             <a:fld id="{999A8DD2-C443-44AD-85B3-4CE72B962C5F}" type="datetimeFigureOut">
               <a:rPr lang="en-US" smtClean="0"/>
-              <a:t>5/21/24</a:t>
+              <a:t>5/25/24</a:t>
             </a:fld>
             <a:endParaRPr lang="en-US"/>
           </a:p>
@@ -1870,7 +1876,7 @@
           <a:p>
             <a:fld id="{999A8DD2-C443-44AD-85B3-4CE72B962C5F}" type="datetimeFigureOut">
               <a:rPr lang="en-US" smtClean="0"/>
-              <a:t>5/21/24</a:t>
+              <a:t>5/25/24</a:t>
             </a:fld>
             <a:endParaRPr lang="en-US"/>
           </a:p>
@@ -2011,7 +2017,7 @@
           <a:p>
             <a:fld id="{999A8DD2-C443-44AD-85B3-4CE72B962C5F}" type="datetimeFigureOut">
               <a:rPr lang="en-US" smtClean="0"/>
-              <a:t>5/21/24</a:t>
+              <a:t>5/25/24</a:t>
             </a:fld>
             <a:endParaRPr lang="en-US"/>
           </a:p>
@@ -2124,7 +2130,7 @@
           <a:p>
             <a:fld id="{999A8DD2-C443-44AD-85B3-4CE72B962C5F}" type="datetimeFigureOut">
               <a:rPr lang="en-US" smtClean="0"/>
-              <a:t>5/21/24</a:t>
+              <a:t>5/25/24</a:t>
             </a:fld>
             <a:endParaRPr lang="en-US"/>
           </a:p>
@@ -2443,7 +2449,7 @@
           <a:p>
             <a:fld id="{999A8DD2-C443-44AD-85B3-4CE72B962C5F}" type="datetimeFigureOut">
               <a:rPr lang="en-US" smtClean="0"/>
-              <a:t>5/21/24</a:t>
+              <a:t>5/25/24</a:t>
             </a:fld>
             <a:endParaRPr lang="en-US"/>
           </a:p>
@@ -2737,7 +2743,7 @@
           <a:p>
             <a:fld id="{999A8DD2-C443-44AD-85B3-4CE72B962C5F}" type="datetimeFigureOut">
               <a:rPr lang="en-US" smtClean="0"/>
-              <a:t>5/21/24</a:t>
+              <a:t>5/25/24</a:t>
             </a:fld>
             <a:endParaRPr lang="en-US"/>
           </a:p>
@@ -2977,7 +2983,7 @@
           <a:p>
             <a:fld id="{999A8DD2-C443-44AD-85B3-4CE72B962C5F}" type="datetimeFigureOut">
               <a:rPr lang="en-US" smtClean="0"/>
-              <a:t>5/21/24</a:t>
+              <a:t>5/25/24</a:t>
             </a:fld>
             <a:endParaRPr lang="en-US"/>
           </a:p>
@@ -4058,10 +4064,10 @@
       </p:sp>
       <p:pic>
         <p:nvPicPr>
-          <p:cNvPr id="4" name="Picture 2" descr="Structure of the LSTM cell and equations that describe the gates of an... |  Download Scientific Diagram">
-            <a:extLst>
-              <a:ext uri="{FF2B5EF4-FFF2-40B4-BE49-F238E27FC236}">
-                <a16:creationId xmlns:a16="http://schemas.microsoft.com/office/drawing/2014/main" id="{F39EFD60-950A-24FD-EF8D-21CD2C7B0443}"/>
+          <p:cNvPr id="1026" name="Picture 2" descr="LSTM Gradients. Detailed mathematical derivation of… | by Rahuljha |  Towards Data Science">
+            <a:extLst>
+              <a:ext uri="{FF2B5EF4-FFF2-40B4-BE49-F238E27FC236}">
+                <a16:creationId xmlns:a16="http://schemas.microsoft.com/office/drawing/2014/main" id="{E6C51E50-93D7-6C00-0E0D-48CF1387EAAA}"/>
               </a:ext>
             </a:extLst>
           </p:cNvPr>
@@ -4070,7 +4076,7 @@
           </p:cNvPicPr>
           <p:nvPr/>
         </p:nvPicPr>
-        <p:blipFill>
+        <p:blipFill rotWithShape="1">
           <a:blip r:embed="rId2">
             <a:extLst>
               <a:ext uri="{28A0092B-C50C-407E-A947-70E740481C1C}">
@@ -4078,15 +4084,13 @@
               </a:ext>
             </a:extLst>
           </a:blip>
-          <a:srcRect/>
-          <a:stretch>
-            <a:fillRect/>
-          </a:stretch>
+          <a:srcRect l="5501" r="4598" b="18743"/>
+          <a:stretch/>
         </p:blipFill>
         <p:spPr bwMode="auto">
           <a:xfrm>
-            <a:off x="670309" y="1989817"/>
-            <a:ext cx="10851381" cy="3958116"/>
+            <a:off x="612648" y="1680898"/>
+            <a:ext cx="5754413" cy="4323912"/>
           </a:xfrm>
           <a:prstGeom prst="rect">
             <a:avLst/>
@@ -4103,6 +4107,146 @@
           </a:extLst>
         </p:spPr>
       </p:pic>
+      <p:pic>
+        <p:nvPicPr>
+          <p:cNvPr id="1028" name="Picture 4" descr="LSTM and its equations. LSTM stands for Long Short Term Memory… | by  Divyanshu Thakur | Medium">
+            <a:extLst>
+              <a:ext uri="{FF2B5EF4-FFF2-40B4-BE49-F238E27FC236}">
+                <a16:creationId xmlns:a16="http://schemas.microsoft.com/office/drawing/2014/main" id="{8B762B1C-BB59-B351-C20F-9327C01AD23E}"/>
+              </a:ext>
+            </a:extLst>
+          </p:cNvPr>
+          <p:cNvPicPr>
+            <a:picLocks noChangeAspect="1" noChangeArrowheads="1"/>
+          </p:cNvPicPr>
+          <p:nvPr/>
+        </p:nvPicPr>
+        <p:blipFill>
+          <a:blip r:embed="rId3">
+            <a:extLst>
+              <a:ext uri="{BEBA8EAE-BF5A-486C-A8C5-ECC9F3942E4B}">
+                <a14:imgProps xmlns:a14="http://schemas.microsoft.com/office/drawing/2010/main">
+                  <a14:imgLayer r:embed="rId4">
+                    <a14:imgEffect>
+                      <a14:saturation sat="0"/>
+                    </a14:imgEffect>
+                  </a14:imgLayer>
+                </a14:imgProps>
+              </a:ext>
+              <a:ext uri="{28A0092B-C50C-407E-A947-70E740481C1C}">
+                <a14:useLocalDpi xmlns:a14="http://schemas.microsoft.com/office/drawing/2010/main" val="0"/>
+              </a:ext>
+            </a:extLst>
+          </a:blip>
+          <a:srcRect/>
+          <a:stretch>
+            <a:fillRect/>
+          </a:stretch>
+        </p:blipFill>
+        <p:spPr bwMode="auto">
+          <a:xfrm>
+            <a:off x="7476928" y="1823469"/>
+            <a:ext cx="3228434" cy="1815994"/>
+          </a:xfrm>
+          <a:prstGeom prst="rect">
+            <a:avLst/>
+          </a:prstGeom>
+          <a:noFill/>
+          <a:extLst>
+            <a:ext uri="{909E8E84-426E-40DD-AFC4-6F175D3DCCD1}">
+              <a14:hiddenFill xmlns:a14="http://schemas.microsoft.com/office/drawing/2010/main">
+                <a:solidFill>
+                  <a:srgbClr val="FFFFFF"/>
+                </a:solidFill>
+              </a14:hiddenFill>
+            </a:ext>
+          </a:extLst>
+        </p:spPr>
+      </p:pic>
+      <p:pic>
+        <p:nvPicPr>
+          <p:cNvPr id="1030" name="Picture 6" descr="LSTM and its equations. LSTM stands for Long Short Term Memory… | by  Divyanshu Thakur | Medium">
+            <a:extLst>
+              <a:ext uri="{FF2B5EF4-FFF2-40B4-BE49-F238E27FC236}">
+                <a16:creationId xmlns:a16="http://schemas.microsoft.com/office/drawing/2014/main" id="{5402F9BA-9BF1-D932-7FE0-DB89655BA8D0}"/>
+              </a:ext>
+            </a:extLst>
+          </p:cNvPr>
+          <p:cNvPicPr>
+            <a:picLocks noChangeAspect="1" noChangeArrowheads="1"/>
+          </p:cNvPicPr>
+          <p:nvPr/>
+        </p:nvPicPr>
+        <p:blipFill>
+          <a:blip r:embed="rId5">
+            <a:extLst>
+              <a:ext uri="{28A0092B-C50C-407E-A947-70E740481C1C}">
+                <a14:useLocalDpi xmlns:a14="http://schemas.microsoft.com/office/drawing/2010/main" val="0"/>
+              </a:ext>
+            </a:extLst>
+          </a:blip>
+          <a:srcRect/>
+          <a:stretch>
+            <a:fillRect/>
+          </a:stretch>
+        </p:blipFill>
+        <p:spPr bwMode="auto">
+          <a:xfrm>
+            <a:off x="7333623" y="3782034"/>
+            <a:ext cx="3932603" cy="2222776"/>
+          </a:xfrm>
+          <a:prstGeom prst="rect">
+            <a:avLst/>
+          </a:prstGeom>
+          <a:noFill/>
+          <a:extLst>
+            <a:ext uri="{909E8E84-426E-40DD-AFC4-6F175D3DCCD1}">
+              <a14:hiddenFill xmlns:a14="http://schemas.microsoft.com/office/drawing/2010/main">
+                <a:solidFill>
+                  <a:srgbClr val="FFFFFF"/>
+                </a:solidFill>
+              </a14:hiddenFill>
+            </a:ext>
+          </a:extLst>
+        </p:spPr>
+      </p:pic>
+      <p:cxnSp>
+        <p:nvCxnSpPr>
+          <p:cNvPr id="7" name="Conector recto 6">
+            <a:extLst>
+              <a:ext uri="{FF2B5EF4-FFF2-40B4-BE49-F238E27FC236}">
+                <a16:creationId xmlns:a16="http://schemas.microsoft.com/office/drawing/2014/main" id="{BBC4A51E-90C9-EB53-4FBF-4BC520DEAD73}"/>
+              </a:ext>
+            </a:extLst>
+          </p:cNvPr>
+          <p:cNvCxnSpPr/>
+          <p:nvPr/>
+        </p:nvCxnSpPr>
+        <p:spPr>
+          <a:xfrm>
+            <a:off x="7476928" y="3842854"/>
+            <a:ext cx="3626501" cy="0"/>
+          </a:xfrm>
+          <a:prstGeom prst="line">
+            <a:avLst/>
+          </a:prstGeom>
+          <a:ln w="0" cmpd="tri"/>
+        </p:spPr>
+        <p:style>
+          <a:lnRef idx="1">
+            <a:schemeClr val="dk1"/>
+          </a:lnRef>
+          <a:fillRef idx="0">
+            <a:schemeClr val="dk1"/>
+          </a:fillRef>
+          <a:effectRef idx="0">
+            <a:schemeClr val="dk1"/>
+          </a:effectRef>
+          <a:fontRef idx="minor">
+            <a:schemeClr val="tx1"/>
+          </a:fontRef>
+        </p:style>
+      </p:cxnSp>
     </p:spTree>
     <p:extLst>
       <p:ext uri="{BB962C8B-B14F-4D97-AF65-F5344CB8AC3E}">
@@ -4625,6 +4769,111 @@
 </p:sld>
 </file>
 
+<file path=ppt/slides/slide19.xml><?xml version="1.0" encoding="utf-8"?>
+<p:sld xmlns:a="http://schemas.openxmlformats.org/drawingml/2006/main" xmlns:r="http://schemas.openxmlformats.org/officeDocument/2006/relationships" xmlns:p="http://schemas.openxmlformats.org/presentationml/2006/main">
+  <p:cSld>
+    <p:spTree>
+      <p:nvGrpSpPr>
+        <p:cNvPr id="1" name=""/>
+        <p:cNvGrpSpPr/>
+        <p:nvPr/>
+      </p:nvGrpSpPr>
+      <p:grpSpPr>
+        <a:xfrm>
+          <a:off x="0" y="0"/>
+          <a:ext cx="0" cy="0"/>
+          <a:chOff x="0" y="0"/>
+          <a:chExt cx="0" cy="0"/>
+        </a:xfrm>
+      </p:grpSpPr>
+      <p:sp>
+        <p:nvSpPr>
+          <p:cNvPr id="2" name="Título 1">
+            <a:extLst>
+              <a:ext uri="{FF2B5EF4-FFF2-40B4-BE49-F238E27FC236}">
+                <a16:creationId xmlns:a16="http://schemas.microsoft.com/office/drawing/2014/main" id="{F482F6D0-0679-DF9E-4E81-39CC04A998AD}"/>
+              </a:ext>
+            </a:extLst>
+          </p:cNvPr>
+          <p:cNvSpPr>
+            <a:spLocks noGrp="1"/>
+          </p:cNvSpPr>
+          <p:nvPr>
+            <p:ph type="title"/>
+          </p:nvPr>
+        </p:nvSpPr>
+        <p:spPr/>
+        <p:txBody>
+          <a:bodyPr/>
+          <a:lstStyle/>
+          <a:p>
+            <a:r>
+              <a:rPr lang="es-ES_tradnl" dirty="0"/>
+              <a:t>Modelos Seq2seq</a:t>
+            </a:r>
+          </a:p>
+        </p:txBody>
+      </p:sp>
+      <p:pic>
+        <p:nvPicPr>
+          <p:cNvPr id="2050" name="Picture 2" descr="Illustration of Seq2Seq-LSTM architecture. | Download Scientific Diagram">
+            <a:extLst>
+              <a:ext uri="{FF2B5EF4-FFF2-40B4-BE49-F238E27FC236}">
+                <a16:creationId xmlns:a16="http://schemas.microsoft.com/office/drawing/2014/main" id="{4890A447-06CC-24C1-F30C-94A7077403D0}"/>
+              </a:ext>
+            </a:extLst>
+          </p:cNvPr>
+          <p:cNvPicPr>
+            <a:picLocks noChangeAspect="1" noChangeArrowheads="1"/>
+          </p:cNvPicPr>
+          <p:nvPr/>
+        </p:nvPicPr>
+        <p:blipFill>
+          <a:blip r:embed="rId2">
+            <a:extLst>
+              <a:ext uri="{28A0092B-C50C-407E-A947-70E740481C1C}">
+                <a14:useLocalDpi xmlns:a14="http://schemas.microsoft.com/office/drawing/2010/main" val="0"/>
+              </a:ext>
+            </a:extLst>
+          </a:blip>
+          <a:srcRect/>
+          <a:stretch>
+            <a:fillRect/>
+          </a:stretch>
+        </p:blipFill>
+        <p:spPr bwMode="auto">
+          <a:xfrm>
+            <a:off x="1571171" y="1421603"/>
+            <a:ext cx="9049657" cy="5014575"/>
+          </a:xfrm>
+          <a:prstGeom prst="rect">
+            <a:avLst/>
+          </a:prstGeom>
+          <a:noFill/>
+          <a:extLst>
+            <a:ext uri="{909E8E84-426E-40DD-AFC4-6F175D3DCCD1}">
+              <a14:hiddenFill xmlns:a14="http://schemas.microsoft.com/office/drawing/2010/main">
+                <a:solidFill>
+                  <a:srgbClr val="FFFFFF"/>
+                </a:solidFill>
+              </a14:hiddenFill>
+            </a:ext>
+          </a:extLst>
+        </p:spPr>
+      </p:pic>
+    </p:spTree>
+    <p:extLst>
+      <p:ext uri="{BB962C8B-B14F-4D97-AF65-F5344CB8AC3E}">
+        <p14:creationId xmlns:p14="http://schemas.microsoft.com/office/powerpoint/2010/main" val="282707993"/>
+      </p:ext>
+    </p:extLst>
+  </p:cSld>
+  <p:clrMapOvr>
+    <a:masterClrMapping/>
+  </p:clrMapOvr>
+</p:sld>
+</file>
+
 <file path=ppt/slides/slide2.xml><?xml version="1.0" encoding="utf-8"?>
 <p:sld xmlns:a="http://schemas.openxmlformats.org/drawingml/2006/main" xmlns:r="http://schemas.openxmlformats.org/officeDocument/2006/relationships" xmlns:p="http://schemas.openxmlformats.org/presentationml/2006/main">
   <p:cSld>
@@ -4719,6 +4968,694 @@
     <p:extLst>
       <p:ext uri="{BB962C8B-B14F-4D97-AF65-F5344CB8AC3E}">
         <p14:creationId xmlns:p14="http://schemas.microsoft.com/office/powerpoint/2010/main" val="3759623877"/>
+      </p:ext>
+    </p:extLst>
+  </p:cSld>
+  <p:clrMapOvr>
+    <a:masterClrMapping/>
+  </p:clrMapOvr>
+</p:sld>
+</file>
+
+<file path=ppt/slides/slide20.xml><?xml version="1.0" encoding="utf-8"?>
+<p:sld xmlns:a="http://schemas.openxmlformats.org/drawingml/2006/main" xmlns:r="http://schemas.openxmlformats.org/officeDocument/2006/relationships" xmlns:p="http://schemas.openxmlformats.org/presentationml/2006/main">
+  <p:cSld>
+    <p:spTree>
+      <p:nvGrpSpPr>
+        <p:cNvPr id="1" name=""/>
+        <p:cNvGrpSpPr/>
+        <p:nvPr/>
+      </p:nvGrpSpPr>
+      <p:grpSpPr>
+        <a:xfrm>
+          <a:off x="0" y="0"/>
+          <a:ext cx="0" cy="0"/>
+          <a:chOff x="0" y="0"/>
+          <a:chExt cx="0" cy="0"/>
+        </a:xfrm>
+      </p:grpSpPr>
+      <p:sp>
+        <p:nvSpPr>
+          <p:cNvPr id="2" name="Título 1">
+            <a:extLst>
+              <a:ext uri="{FF2B5EF4-FFF2-40B4-BE49-F238E27FC236}">
+                <a16:creationId xmlns:a16="http://schemas.microsoft.com/office/drawing/2014/main" id="{F482F6D0-0679-DF9E-4E81-39CC04A998AD}"/>
+              </a:ext>
+            </a:extLst>
+          </p:cNvPr>
+          <p:cNvSpPr>
+            <a:spLocks noGrp="1"/>
+          </p:cNvSpPr>
+          <p:nvPr>
+            <p:ph type="title"/>
+          </p:nvPr>
+        </p:nvSpPr>
+        <p:spPr/>
+        <p:txBody>
+          <a:bodyPr/>
+          <a:lstStyle/>
+          <a:p>
+            <a:r>
+              <a:rPr lang="es-ES_tradnl" dirty="0"/>
+              <a:t>Modelos Seq2seq</a:t>
+            </a:r>
+          </a:p>
+        </p:txBody>
+      </p:sp>
+      <p:pic>
+        <p:nvPicPr>
+          <p:cNvPr id="4098" name="Picture 2" descr="Seq2seq LSTM structure. | Download Scientific Diagram">
+            <a:extLst>
+              <a:ext uri="{FF2B5EF4-FFF2-40B4-BE49-F238E27FC236}">
+                <a16:creationId xmlns:a16="http://schemas.microsoft.com/office/drawing/2014/main" id="{442DDA78-FF13-4569-AF88-21CCB681C830}"/>
+              </a:ext>
+            </a:extLst>
+          </p:cNvPr>
+          <p:cNvPicPr>
+            <a:picLocks noChangeAspect="1" noChangeArrowheads="1"/>
+          </p:cNvPicPr>
+          <p:nvPr/>
+        </p:nvPicPr>
+        <p:blipFill>
+          <a:blip r:embed="rId2">
+            <a:extLst>
+              <a:ext uri="{28A0092B-C50C-407E-A947-70E740481C1C}">
+                <a14:useLocalDpi xmlns:a14="http://schemas.microsoft.com/office/drawing/2010/main" val="0"/>
+              </a:ext>
+            </a:extLst>
+          </a:blip>
+          <a:srcRect/>
+          <a:stretch>
+            <a:fillRect/>
+          </a:stretch>
+        </p:blipFill>
+        <p:spPr bwMode="auto">
+          <a:xfrm>
+            <a:off x="471226" y="1968500"/>
+            <a:ext cx="10795000" cy="3378200"/>
+          </a:xfrm>
+          <a:prstGeom prst="rect">
+            <a:avLst/>
+          </a:prstGeom>
+          <a:noFill/>
+          <a:extLst>
+            <a:ext uri="{909E8E84-426E-40DD-AFC4-6F175D3DCCD1}">
+              <a14:hiddenFill xmlns:a14="http://schemas.microsoft.com/office/drawing/2010/main">
+                <a:solidFill>
+                  <a:srgbClr val="FFFFFF"/>
+                </a:solidFill>
+              </a14:hiddenFill>
+            </a:ext>
+          </a:extLst>
+        </p:spPr>
+      </p:pic>
+    </p:spTree>
+    <p:extLst>
+      <p:ext uri="{BB962C8B-B14F-4D97-AF65-F5344CB8AC3E}">
+        <p14:creationId xmlns:p14="http://schemas.microsoft.com/office/powerpoint/2010/main" val="4035337453"/>
+      </p:ext>
+    </p:extLst>
+  </p:cSld>
+  <p:clrMapOvr>
+    <a:masterClrMapping/>
+  </p:clrMapOvr>
+</p:sld>
+</file>
+
+<file path=ppt/slides/slide21.xml><?xml version="1.0" encoding="utf-8"?>
+<p:sld xmlns:a="http://schemas.openxmlformats.org/drawingml/2006/main" xmlns:r="http://schemas.openxmlformats.org/officeDocument/2006/relationships" xmlns:p="http://schemas.openxmlformats.org/presentationml/2006/main">
+  <p:cSld>
+    <p:spTree>
+      <p:nvGrpSpPr>
+        <p:cNvPr id="1" name=""/>
+        <p:cNvGrpSpPr/>
+        <p:nvPr/>
+      </p:nvGrpSpPr>
+      <p:grpSpPr>
+        <a:xfrm>
+          <a:off x="0" y="0"/>
+          <a:ext cx="0" cy="0"/>
+          <a:chOff x="0" y="0"/>
+          <a:chExt cx="0" cy="0"/>
+        </a:xfrm>
+      </p:grpSpPr>
+      <p:sp>
+        <p:nvSpPr>
+          <p:cNvPr id="2" name="Título 1">
+            <a:extLst>
+              <a:ext uri="{FF2B5EF4-FFF2-40B4-BE49-F238E27FC236}">
+                <a16:creationId xmlns:a16="http://schemas.microsoft.com/office/drawing/2014/main" id="{F482F6D0-0679-DF9E-4E81-39CC04A998AD}"/>
+              </a:ext>
+            </a:extLst>
+          </p:cNvPr>
+          <p:cNvSpPr>
+            <a:spLocks noGrp="1"/>
+          </p:cNvSpPr>
+          <p:nvPr>
+            <p:ph type="title"/>
+          </p:nvPr>
+        </p:nvSpPr>
+        <p:spPr/>
+        <p:txBody>
+          <a:bodyPr/>
+          <a:lstStyle/>
+          <a:p>
+            <a:r>
+              <a:rPr lang="es-ES_tradnl" dirty="0" err="1"/>
+              <a:t>DeepAR</a:t>
+            </a:r>
+            <a:endParaRPr lang="es-ES_tradnl" dirty="0"/>
+          </a:p>
+        </p:txBody>
+      </p:sp>
+      <p:pic>
+        <p:nvPicPr>
+          <p:cNvPr id="6146" name="Picture 2" descr="Mathematical operations in DeepAR during training">
+            <a:extLst>
+              <a:ext uri="{FF2B5EF4-FFF2-40B4-BE49-F238E27FC236}">
+                <a16:creationId xmlns:a16="http://schemas.microsoft.com/office/drawing/2014/main" id="{3184848F-5E37-24E6-6364-E941CB5BB21B}"/>
+              </a:ext>
+            </a:extLst>
+          </p:cNvPr>
+          <p:cNvPicPr>
+            <a:picLocks noChangeAspect="1" noChangeArrowheads="1"/>
+          </p:cNvPicPr>
+          <p:nvPr/>
+        </p:nvPicPr>
+        <p:blipFill rotWithShape="1">
+          <a:blip r:embed="rId2">
+            <a:extLst>
+              <a:ext uri="{28A0092B-C50C-407E-A947-70E740481C1C}">
+                <a14:useLocalDpi xmlns:a14="http://schemas.microsoft.com/office/drawing/2010/main" val="0"/>
+              </a:ext>
+            </a:extLst>
+          </a:blip>
+          <a:srcRect l="4498" t="6876" r="2852" b="4481"/>
+          <a:stretch/>
+        </p:blipFill>
+        <p:spPr bwMode="auto">
+          <a:xfrm>
+            <a:off x="440871" y="2275258"/>
+            <a:ext cx="5318446" cy="2791242"/>
+          </a:xfrm>
+          <a:prstGeom prst="rect">
+            <a:avLst/>
+          </a:prstGeom>
+          <a:noFill/>
+          <a:extLst>
+            <a:ext uri="{909E8E84-426E-40DD-AFC4-6F175D3DCCD1}">
+              <a14:hiddenFill xmlns:a14="http://schemas.microsoft.com/office/drawing/2010/main">
+                <a:solidFill>
+                  <a:srgbClr val="FFFFFF"/>
+                </a:solidFill>
+              </a14:hiddenFill>
+            </a:ext>
+          </a:extLst>
+        </p:spPr>
+      </p:pic>
+      <p:sp>
+        <p:nvSpPr>
+          <p:cNvPr id="3" name="CuadroTexto 2">
+            <a:extLst>
+              <a:ext uri="{FF2B5EF4-FFF2-40B4-BE49-F238E27FC236}">
+                <a16:creationId xmlns:a16="http://schemas.microsoft.com/office/drawing/2014/main" id="{95341D19-9047-9F5D-A66C-4CC22780DC53}"/>
+              </a:ext>
+            </a:extLst>
+          </p:cNvPr>
+          <p:cNvSpPr txBox="1"/>
+          <p:nvPr/>
+        </p:nvSpPr>
+        <p:spPr>
+          <a:xfrm>
+            <a:off x="2221616" y="5428152"/>
+            <a:ext cx="1756956" cy="369332"/>
+          </a:xfrm>
+          <a:prstGeom prst="rect">
+            <a:avLst/>
+          </a:prstGeom>
+          <a:noFill/>
+        </p:spPr>
+        <p:txBody>
+          <a:bodyPr wrap="none" rtlCol="0">
+            <a:spAutoFit/>
+          </a:bodyPr>
+          <a:lstStyle/>
+          <a:p>
+            <a:r>
+              <a:rPr lang="es-ES_tradnl" dirty="0"/>
+              <a:t>Entrenamiento</a:t>
+            </a:r>
+          </a:p>
+        </p:txBody>
+      </p:sp>
+      <p:pic>
+        <p:nvPicPr>
+          <p:cNvPr id="6148" name="Picture 4" descr="Mathematical operations in DeepAR training inference">
+            <a:extLst>
+              <a:ext uri="{FF2B5EF4-FFF2-40B4-BE49-F238E27FC236}">
+                <a16:creationId xmlns:a16="http://schemas.microsoft.com/office/drawing/2014/main" id="{B3DF9CCD-21A2-D29C-CDC9-F228E69D6143}"/>
+              </a:ext>
+            </a:extLst>
+          </p:cNvPr>
+          <p:cNvPicPr>
+            <a:picLocks noChangeAspect="1" noChangeArrowheads="1"/>
+          </p:cNvPicPr>
+          <p:nvPr/>
+        </p:nvPicPr>
+        <p:blipFill rotWithShape="1">
+          <a:blip r:embed="rId3">
+            <a:extLst>
+              <a:ext uri="{28A0092B-C50C-407E-A947-70E740481C1C}">
+                <a14:useLocalDpi xmlns:a14="http://schemas.microsoft.com/office/drawing/2010/main" val="0"/>
+              </a:ext>
+            </a:extLst>
+          </a:blip>
+          <a:srcRect l="3851" t="7515" r="4812" b="4715"/>
+          <a:stretch/>
+        </p:blipFill>
+        <p:spPr bwMode="auto">
+          <a:xfrm>
+            <a:off x="6432685" y="2275258"/>
+            <a:ext cx="5295167" cy="2791242"/>
+          </a:xfrm>
+          <a:prstGeom prst="rect">
+            <a:avLst/>
+          </a:prstGeom>
+          <a:noFill/>
+          <a:extLst>
+            <a:ext uri="{909E8E84-426E-40DD-AFC4-6F175D3DCCD1}">
+              <a14:hiddenFill xmlns:a14="http://schemas.microsoft.com/office/drawing/2010/main">
+                <a:solidFill>
+                  <a:srgbClr val="FFFFFF"/>
+                </a:solidFill>
+              </a14:hiddenFill>
+            </a:ext>
+          </a:extLst>
+        </p:spPr>
+      </p:pic>
+      <p:sp>
+        <p:nvSpPr>
+          <p:cNvPr id="4" name="CuadroTexto 3">
+            <a:extLst>
+              <a:ext uri="{FF2B5EF4-FFF2-40B4-BE49-F238E27FC236}">
+                <a16:creationId xmlns:a16="http://schemas.microsoft.com/office/drawing/2014/main" id="{EE036FFB-3749-4562-8539-AC211E89B29C}"/>
+              </a:ext>
+            </a:extLst>
+          </p:cNvPr>
+          <p:cNvSpPr txBox="1"/>
+          <p:nvPr/>
+        </p:nvSpPr>
+        <p:spPr>
+          <a:xfrm>
+            <a:off x="8458623" y="5428152"/>
+            <a:ext cx="1243289" cy="369332"/>
+          </a:xfrm>
+          <a:prstGeom prst="rect">
+            <a:avLst/>
+          </a:prstGeom>
+          <a:noFill/>
+        </p:spPr>
+        <p:txBody>
+          <a:bodyPr wrap="none" rtlCol="0">
+            <a:spAutoFit/>
+          </a:bodyPr>
+          <a:lstStyle/>
+          <a:p>
+            <a:r>
+              <a:rPr lang="es-ES_tradnl" dirty="0"/>
+              <a:t>Inferencia</a:t>
+            </a:r>
+          </a:p>
+        </p:txBody>
+      </p:sp>
+    </p:spTree>
+    <p:extLst>
+      <p:ext uri="{BB962C8B-B14F-4D97-AF65-F5344CB8AC3E}">
+        <p14:creationId xmlns:p14="http://schemas.microsoft.com/office/powerpoint/2010/main" val="902458582"/>
+      </p:ext>
+    </p:extLst>
+  </p:cSld>
+  <p:clrMapOvr>
+    <a:masterClrMapping/>
+  </p:clrMapOvr>
+</p:sld>
+</file>
+
+<file path=ppt/slides/slide22.xml><?xml version="1.0" encoding="utf-8"?>
+<p:sld xmlns:a="http://schemas.openxmlformats.org/drawingml/2006/main" xmlns:r="http://schemas.openxmlformats.org/officeDocument/2006/relationships" xmlns:p="http://schemas.openxmlformats.org/presentationml/2006/main">
+  <p:cSld>
+    <p:spTree>
+      <p:nvGrpSpPr>
+        <p:cNvPr id="1" name=""/>
+        <p:cNvGrpSpPr/>
+        <p:nvPr/>
+      </p:nvGrpSpPr>
+      <p:grpSpPr>
+        <a:xfrm>
+          <a:off x="0" y="0"/>
+          <a:ext cx="0" cy="0"/>
+          <a:chOff x="0" y="0"/>
+          <a:chExt cx="0" cy="0"/>
+        </a:xfrm>
+      </p:grpSpPr>
+      <p:sp>
+        <p:nvSpPr>
+          <p:cNvPr id="2" name="Título 1">
+            <a:extLst>
+              <a:ext uri="{FF2B5EF4-FFF2-40B4-BE49-F238E27FC236}">
+                <a16:creationId xmlns:a16="http://schemas.microsoft.com/office/drawing/2014/main" id="{F482F6D0-0679-DF9E-4E81-39CC04A998AD}"/>
+              </a:ext>
+            </a:extLst>
+          </p:cNvPr>
+          <p:cNvSpPr>
+            <a:spLocks noGrp="1"/>
+          </p:cNvSpPr>
+          <p:nvPr>
+            <p:ph type="title"/>
+          </p:nvPr>
+        </p:nvSpPr>
+        <p:spPr/>
+        <p:txBody>
+          <a:bodyPr/>
+          <a:lstStyle/>
+          <a:p>
+            <a:r>
+              <a:rPr lang="es-ES_tradnl" dirty="0" err="1"/>
+              <a:t>DeepAR</a:t>
+            </a:r>
+            <a:endParaRPr lang="es-ES_tradnl" dirty="0"/>
+          </a:p>
+        </p:txBody>
+      </p:sp>
+      <p:pic>
+        <p:nvPicPr>
+          <p:cNvPr id="8194" name="Picture 2" descr="Parameter calculation of μ and σ">
+            <a:extLst>
+              <a:ext uri="{FF2B5EF4-FFF2-40B4-BE49-F238E27FC236}">
+                <a16:creationId xmlns:a16="http://schemas.microsoft.com/office/drawing/2014/main" id="{88DC2801-ACBF-50B8-8726-5742178A50BE}"/>
+              </a:ext>
+            </a:extLst>
+          </p:cNvPr>
+          <p:cNvPicPr>
+            <a:picLocks noChangeAspect="1" noChangeArrowheads="1"/>
+          </p:cNvPicPr>
+          <p:nvPr/>
+        </p:nvPicPr>
+        <p:blipFill rotWithShape="1">
+          <a:blip r:embed="rId2">
+            <a:extLst>
+              <a:ext uri="{28A0092B-C50C-407E-A947-70E740481C1C}">
+                <a14:useLocalDpi xmlns:a14="http://schemas.microsoft.com/office/drawing/2010/main" val="0"/>
+              </a:ext>
+            </a:extLst>
+          </a:blip>
+          <a:srcRect l="6592" t="3667" r="5429" b="5364"/>
+          <a:stretch/>
+        </p:blipFill>
+        <p:spPr bwMode="auto">
+          <a:xfrm>
+            <a:off x="2554476" y="1114769"/>
+            <a:ext cx="7083048" cy="5545184"/>
+          </a:xfrm>
+          <a:prstGeom prst="rect">
+            <a:avLst/>
+          </a:prstGeom>
+          <a:noFill/>
+          <a:extLst>
+            <a:ext uri="{909E8E84-426E-40DD-AFC4-6F175D3DCCD1}">
+              <a14:hiddenFill xmlns:a14="http://schemas.microsoft.com/office/drawing/2010/main">
+                <a:solidFill>
+                  <a:srgbClr val="FFFFFF"/>
+                </a:solidFill>
+              </a14:hiddenFill>
+            </a:ext>
+          </a:extLst>
+        </p:spPr>
+      </p:pic>
+    </p:spTree>
+    <p:extLst>
+      <p:ext uri="{BB962C8B-B14F-4D97-AF65-F5344CB8AC3E}">
+        <p14:creationId xmlns:p14="http://schemas.microsoft.com/office/powerpoint/2010/main" val="800049460"/>
+      </p:ext>
+    </p:extLst>
+  </p:cSld>
+  <p:clrMapOvr>
+    <a:masterClrMapping/>
+  </p:clrMapOvr>
+</p:sld>
+</file>
+
+<file path=ppt/slides/slide23.xml><?xml version="1.0" encoding="utf-8"?>
+<p:sld xmlns:a="http://schemas.openxmlformats.org/drawingml/2006/main" xmlns:r="http://schemas.openxmlformats.org/officeDocument/2006/relationships" xmlns:p="http://schemas.openxmlformats.org/presentationml/2006/main">
+  <p:cSld>
+    <p:spTree>
+      <p:nvGrpSpPr>
+        <p:cNvPr id="1" name=""/>
+        <p:cNvGrpSpPr/>
+        <p:nvPr/>
+      </p:nvGrpSpPr>
+      <p:grpSpPr>
+        <a:xfrm>
+          <a:off x="0" y="0"/>
+          <a:ext cx="0" cy="0"/>
+          <a:chOff x="0" y="0"/>
+          <a:chExt cx="0" cy="0"/>
+        </a:xfrm>
+      </p:grpSpPr>
+      <p:sp>
+        <p:nvSpPr>
+          <p:cNvPr id="2" name="Título 1">
+            <a:extLst>
+              <a:ext uri="{FF2B5EF4-FFF2-40B4-BE49-F238E27FC236}">
+                <a16:creationId xmlns:a16="http://schemas.microsoft.com/office/drawing/2014/main" id="{F482F6D0-0679-DF9E-4E81-39CC04A998AD}"/>
+              </a:ext>
+            </a:extLst>
+          </p:cNvPr>
+          <p:cNvSpPr>
+            <a:spLocks noGrp="1"/>
+          </p:cNvSpPr>
+          <p:nvPr>
+            <p:ph type="title"/>
+          </p:nvPr>
+        </p:nvSpPr>
+        <p:spPr/>
+        <p:txBody>
+          <a:bodyPr/>
+          <a:lstStyle/>
+          <a:p>
+            <a:r>
+              <a:rPr lang="es-ES_tradnl" dirty="0"/>
+              <a:t>TCN</a:t>
+            </a:r>
+          </a:p>
+        </p:txBody>
+      </p:sp>
+      <p:pic>
+        <p:nvPicPr>
+          <p:cNvPr id="10242" name="Picture 2" descr="Multiple Time Series Forecasting with Temporal Convolutional Networks (TCN)  in Python | Forecastegy">
+            <a:extLst>
+              <a:ext uri="{FF2B5EF4-FFF2-40B4-BE49-F238E27FC236}">
+                <a16:creationId xmlns:a16="http://schemas.microsoft.com/office/drawing/2014/main" id="{23D9E02B-B6C9-3874-73B5-3B905C37DBE9}"/>
+              </a:ext>
+            </a:extLst>
+          </p:cNvPr>
+          <p:cNvPicPr>
+            <a:picLocks noChangeAspect="1" noChangeArrowheads="1"/>
+          </p:cNvPicPr>
+          <p:nvPr/>
+        </p:nvPicPr>
+        <p:blipFill rotWithShape="1">
+          <a:blip r:embed="rId2">
+            <a:extLst>
+              <a:ext uri="{28A0092B-C50C-407E-A947-70E740481C1C}">
+                <a14:useLocalDpi xmlns:a14="http://schemas.microsoft.com/office/drawing/2010/main" val="0"/>
+              </a:ext>
+            </a:extLst>
+          </a:blip>
+          <a:srcRect l="7593" t="21191" r="6653" b="23332"/>
+          <a:stretch/>
+        </p:blipFill>
+        <p:spPr bwMode="auto">
+          <a:xfrm>
+            <a:off x="711817" y="1680898"/>
+            <a:ext cx="10455240" cy="3804558"/>
+          </a:xfrm>
+          <a:prstGeom prst="rect">
+            <a:avLst/>
+          </a:prstGeom>
+          <a:noFill/>
+          <a:extLst>
+            <a:ext uri="{909E8E84-426E-40DD-AFC4-6F175D3DCCD1}">
+              <a14:hiddenFill xmlns:a14="http://schemas.microsoft.com/office/drawing/2010/main">
+                <a:solidFill>
+                  <a:srgbClr val="FFFFFF"/>
+                </a:solidFill>
+              </a14:hiddenFill>
+            </a:ext>
+          </a:extLst>
+        </p:spPr>
+      </p:pic>
+    </p:spTree>
+    <p:extLst>
+      <p:ext uri="{BB962C8B-B14F-4D97-AF65-F5344CB8AC3E}">
+        <p14:creationId xmlns:p14="http://schemas.microsoft.com/office/powerpoint/2010/main" val="2382746834"/>
+      </p:ext>
+    </p:extLst>
+  </p:cSld>
+  <p:clrMapOvr>
+    <a:masterClrMapping/>
+  </p:clrMapOvr>
+</p:sld>
+</file>
+
+<file path=ppt/slides/slide24.xml><?xml version="1.0" encoding="utf-8"?>
+<p:sld xmlns:a="http://schemas.openxmlformats.org/drawingml/2006/main" xmlns:r="http://schemas.openxmlformats.org/officeDocument/2006/relationships" xmlns:p="http://schemas.openxmlformats.org/presentationml/2006/main">
+  <p:cSld>
+    <p:spTree>
+      <p:nvGrpSpPr>
+        <p:cNvPr id="1" name=""/>
+        <p:cNvGrpSpPr/>
+        <p:nvPr/>
+      </p:nvGrpSpPr>
+      <p:grpSpPr>
+        <a:xfrm>
+          <a:off x="0" y="0"/>
+          <a:ext cx="0" cy="0"/>
+          <a:chOff x="0" y="0"/>
+          <a:chExt cx="0" cy="0"/>
+        </a:xfrm>
+      </p:grpSpPr>
+      <p:sp>
+        <p:nvSpPr>
+          <p:cNvPr id="2" name="Título 1">
+            <a:extLst>
+              <a:ext uri="{FF2B5EF4-FFF2-40B4-BE49-F238E27FC236}">
+                <a16:creationId xmlns:a16="http://schemas.microsoft.com/office/drawing/2014/main" id="{F482F6D0-0679-DF9E-4E81-39CC04A998AD}"/>
+              </a:ext>
+            </a:extLst>
+          </p:cNvPr>
+          <p:cNvSpPr>
+            <a:spLocks noGrp="1"/>
+          </p:cNvSpPr>
+          <p:nvPr>
+            <p:ph type="title"/>
+          </p:nvPr>
+        </p:nvSpPr>
+        <p:spPr/>
+        <p:txBody>
+          <a:bodyPr/>
+          <a:lstStyle/>
+          <a:p>
+            <a:r>
+              <a:rPr lang="es-ES_tradnl" dirty="0"/>
+              <a:t>TCN</a:t>
+            </a:r>
+          </a:p>
+        </p:txBody>
+      </p:sp>
+      <p:pic>
+        <p:nvPicPr>
+          <p:cNvPr id="12290" name="Picture 2" descr="figure 1">
+            <a:extLst>
+              <a:ext uri="{FF2B5EF4-FFF2-40B4-BE49-F238E27FC236}">
+                <a16:creationId xmlns:a16="http://schemas.microsoft.com/office/drawing/2014/main" id="{7769D674-43F8-E62E-A687-316609A061C2}"/>
+              </a:ext>
+            </a:extLst>
+          </p:cNvPr>
+          <p:cNvPicPr>
+            <a:picLocks noChangeAspect="1" noChangeArrowheads="1"/>
+          </p:cNvPicPr>
+          <p:nvPr/>
+        </p:nvPicPr>
+        <p:blipFill>
+          <a:blip r:embed="rId2">
+            <a:extLst>
+              <a:ext uri="{28A0092B-C50C-407E-A947-70E740481C1C}">
+                <a14:useLocalDpi xmlns:a14="http://schemas.microsoft.com/office/drawing/2010/main" val="0"/>
+              </a:ext>
+            </a:extLst>
+          </a:blip>
+          <a:srcRect/>
+          <a:stretch>
+            <a:fillRect/>
+          </a:stretch>
+        </p:blipFill>
+        <p:spPr bwMode="auto">
+          <a:xfrm>
+            <a:off x="3226266" y="548640"/>
+            <a:ext cx="5739468" cy="5261991"/>
+          </a:xfrm>
+          <a:prstGeom prst="rect">
+            <a:avLst/>
+          </a:prstGeom>
+          <a:noFill/>
+          <a:extLst>
+            <a:ext uri="{909E8E84-426E-40DD-AFC4-6F175D3DCCD1}">
+              <a14:hiddenFill xmlns:a14="http://schemas.microsoft.com/office/drawing/2010/main">
+                <a:solidFill>
+                  <a:srgbClr val="FFFFFF"/>
+                </a:solidFill>
+              </a14:hiddenFill>
+            </a:ext>
+          </a:extLst>
+        </p:spPr>
+      </p:pic>
+      <p:sp>
+        <p:nvSpPr>
+          <p:cNvPr id="3" name="CuadroTexto 2">
+            <a:extLst>
+              <a:ext uri="{FF2B5EF4-FFF2-40B4-BE49-F238E27FC236}">
+                <a16:creationId xmlns:a16="http://schemas.microsoft.com/office/drawing/2014/main" id="{B0F4986E-20A9-3B65-E97F-B33BEEC469A7}"/>
+              </a:ext>
+            </a:extLst>
+          </p:cNvPr>
+          <p:cNvSpPr txBox="1"/>
+          <p:nvPr/>
+        </p:nvSpPr>
+        <p:spPr>
+          <a:xfrm>
+            <a:off x="1240971" y="6113698"/>
+            <a:ext cx="10193753" cy="646331"/>
+          </a:xfrm>
+          <a:prstGeom prst="rect">
+            <a:avLst/>
+          </a:prstGeom>
+          <a:noFill/>
+        </p:spPr>
+        <p:txBody>
+          <a:bodyPr wrap="none" rtlCol="0">
+            <a:spAutoFit/>
+          </a:bodyPr>
+          <a:lstStyle/>
+          <a:p>
+            <a:r>
+              <a:rPr lang="es-MX" b="1" i="0" u="none" strike="noStrike" dirty="0">
+                <a:solidFill>
+                  <a:srgbClr val="222222"/>
+                </a:solidFill>
+                <a:effectLst/>
+                <a:latin typeface="-apple-system"/>
+                <a:hlinkClick r:id="rId3"/>
+              </a:rPr>
+              <a:t>Temporal convolutional networks and data rebalancing for clinical length of stay and mortality prediction</a:t>
+            </a:r>
+            <a:endParaRPr lang="es-MX" b="1" i="0" u="none" strike="noStrike" dirty="0">
+              <a:solidFill>
+                <a:srgbClr val="222222"/>
+              </a:solidFill>
+              <a:effectLst/>
+              <a:latin typeface="-apple-system"/>
+            </a:endParaRPr>
+          </a:p>
+          <a:p>
+            <a:endParaRPr lang="es-ES_tradnl" dirty="0"/>
+          </a:p>
+        </p:txBody>
+      </p:sp>
+    </p:spTree>
+    <p:extLst>
+      <p:ext uri="{BB962C8B-B14F-4D97-AF65-F5344CB8AC3E}">
+        <p14:creationId xmlns:p14="http://schemas.microsoft.com/office/powerpoint/2010/main" val="4077242911"/>
       </p:ext>
     </p:extLst>
   </p:cSld>
@@ -4938,8 +5875,8 @@
           </a:extLst>
         </p:spPr>
       </p:pic>
-      <mc:AlternateContent xmlns:mc="http://schemas.openxmlformats.org/markup-compatibility/2006">
-        <mc:Choice xmlns:a14="http://schemas.microsoft.com/office/drawing/2010/main" Requires="a14">
+      <mc:AlternateContent xmlns:mc="http://schemas.openxmlformats.org/markup-compatibility/2006" xmlns:a14="http://schemas.microsoft.com/office/drawing/2010/main">
+        <mc:Choice Requires="a14">
           <p:sp>
             <p:nvSpPr>
               <p:cNvPr id="3" name="CuadroTexto 2">
@@ -4968,6 +5905,7 @@
               </a:bodyPr>
               <a:lstStyle/>
               <a:p>
+                <a:pPr/>
                 <a14:m>
                   <m:oMathPara xmlns:m="http://schemas.openxmlformats.org/officeDocument/2006/math">
                     <m:oMathParaPr>
@@ -5175,7 +6113,7 @@
             </p:txBody>
           </p:sp>
         </mc:Choice>
-        <mc:Fallback>
+        <mc:Fallback xmlns="">
           <p:sp>
             <p:nvSpPr>
               <p:cNvPr id="3" name="CuadroTexto 2">
@@ -5220,8 +6158,8 @@
           </p:sp>
         </mc:Fallback>
       </mc:AlternateContent>
-      <mc:AlternateContent xmlns:mc="http://schemas.openxmlformats.org/markup-compatibility/2006">
-        <mc:Choice xmlns:a14="http://schemas.microsoft.com/office/drawing/2010/main" Requires="a14">
+      <mc:AlternateContent xmlns:mc="http://schemas.openxmlformats.org/markup-compatibility/2006" xmlns:a14="http://schemas.microsoft.com/office/drawing/2010/main">
+        <mc:Choice Requires="a14">
           <p:sp>
             <p:nvSpPr>
               <p:cNvPr id="5" name="CuadroTexto 4">
@@ -5394,7 +6332,7 @@
             </p:txBody>
           </p:sp>
         </mc:Choice>
-        <mc:Fallback>
+        <mc:Fallback xmlns="">
           <p:sp>
             <p:nvSpPr>
               <p:cNvPr id="5" name="CuadroTexto 4">

</xml_diff>